<commit_message>
Aesthetic changes: Line width change, legend spacing change
</commit_message>
<xml_diff>
--- a/Graph_automization/Ball_and_stick_graph/Template.pptx
+++ b/Graph_automization/Ball_and_stick_graph/Template.pptx
@@ -5,8 +5,7 @@
     <p:sldMasterId id="2147483648" r:id="rId1"/>
   </p:sldMasterIdLst>
   <p:sldIdLst>
-    <p:sldId id="256" r:id="rId2"/>
-    <p:sldId id="257" r:id="rId3"/>
+    <p:sldId id="258" r:id="rId2"/>
   </p:sldIdLst>
   <p:sldSz cx="12192000" cy="6858000"/>
   <p:notesSz cx="6858000" cy="9144000"/>
@@ -262,7 +261,7 @@
           <a:p>
             <a:fld id="{35E44566-E169-1B43-A35F-0A8894463DC4}" type="datetimeFigureOut">
               <a:rPr lang="en-TH" smtClean="0"/>
-              <a:t>9/6/2024 R</a:t>
+              <a:t>13/6/2024 R</a:t>
             </a:fld>
             <a:endParaRPr lang="en-TH"/>
           </a:p>
@@ -462,7 +461,7 @@
           <a:p>
             <a:fld id="{35E44566-E169-1B43-A35F-0A8894463DC4}" type="datetimeFigureOut">
               <a:rPr lang="en-TH" smtClean="0"/>
-              <a:t>9/6/2024 R</a:t>
+              <a:t>13/6/2024 R</a:t>
             </a:fld>
             <a:endParaRPr lang="en-TH"/>
           </a:p>
@@ -672,7 +671,7 @@
           <a:p>
             <a:fld id="{35E44566-E169-1B43-A35F-0A8894463DC4}" type="datetimeFigureOut">
               <a:rPr lang="en-TH" smtClean="0"/>
-              <a:t>9/6/2024 R</a:t>
+              <a:t>13/6/2024 R</a:t>
             </a:fld>
             <a:endParaRPr lang="en-TH"/>
           </a:p>
@@ -872,7 +871,7 @@
           <a:p>
             <a:fld id="{35E44566-E169-1B43-A35F-0A8894463DC4}" type="datetimeFigureOut">
               <a:rPr lang="en-TH" smtClean="0"/>
-              <a:t>9/6/2024 R</a:t>
+              <a:t>13/6/2024 R</a:t>
             </a:fld>
             <a:endParaRPr lang="en-TH"/>
           </a:p>
@@ -1148,7 +1147,7 @@
           <a:p>
             <a:fld id="{35E44566-E169-1B43-A35F-0A8894463DC4}" type="datetimeFigureOut">
               <a:rPr lang="en-TH" smtClean="0"/>
-              <a:t>9/6/2024 R</a:t>
+              <a:t>13/6/2024 R</a:t>
             </a:fld>
             <a:endParaRPr lang="en-TH"/>
           </a:p>
@@ -1416,7 +1415,7 @@
           <a:p>
             <a:fld id="{35E44566-E169-1B43-A35F-0A8894463DC4}" type="datetimeFigureOut">
               <a:rPr lang="en-TH" smtClean="0"/>
-              <a:t>9/6/2024 R</a:t>
+              <a:t>13/6/2024 R</a:t>
             </a:fld>
             <a:endParaRPr lang="en-TH"/>
           </a:p>
@@ -1831,7 +1830,7 @@
           <a:p>
             <a:fld id="{35E44566-E169-1B43-A35F-0A8894463DC4}" type="datetimeFigureOut">
               <a:rPr lang="en-TH" smtClean="0"/>
-              <a:t>9/6/2024 R</a:t>
+              <a:t>13/6/2024 R</a:t>
             </a:fld>
             <a:endParaRPr lang="en-TH"/>
           </a:p>
@@ -1973,7 +1972,7 @@
           <a:p>
             <a:fld id="{35E44566-E169-1B43-A35F-0A8894463DC4}" type="datetimeFigureOut">
               <a:rPr lang="en-TH" smtClean="0"/>
-              <a:t>9/6/2024 R</a:t>
+              <a:t>13/6/2024 R</a:t>
             </a:fld>
             <a:endParaRPr lang="en-TH"/>
           </a:p>
@@ -2086,7 +2085,7 @@
           <a:p>
             <a:fld id="{35E44566-E169-1B43-A35F-0A8894463DC4}" type="datetimeFigureOut">
               <a:rPr lang="en-TH" smtClean="0"/>
-              <a:t>9/6/2024 R</a:t>
+              <a:t>13/6/2024 R</a:t>
             </a:fld>
             <a:endParaRPr lang="en-TH"/>
           </a:p>
@@ -2399,7 +2398,7 @@
           <a:p>
             <a:fld id="{35E44566-E169-1B43-A35F-0A8894463DC4}" type="datetimeFigureOut">
               <a:rPr lang="en-TH" smtClean="0"/>
-              <a:t>9/6/2024 R</a:t>
+              <a:t>13/6/2024 R</a:t>
             </a:fld>
             <a:endParaRPr lang="en-TH"/>
           </a:p>
@@ -2688,7 +2687,7 @@
           <a:p>
             <a:fld id="{35E44566-E169-1B43-A35F-0A8894463DC4}" type="datetimeFigureOut">
               <a:rPr lang="en-TH" smtClean="0"/>
-              <a:t>9/6/2024 R</a:t>
+              <a:t>13/6/2024 R</a:t>
             </a:fld>
             <a:endParaRPr lang="en-TH"/>
           </a:p>
@@ -2815,10 +2814,10 @@
           <a:lstStyle/>
           <a:p>
             <a:r>
-              <a:rPr lang="en-US"/>
+              <a:rPr lang="en-US" dirty="0"/>
               <a:t>Click to edit Master title style</a:t>
             </a:r>
-            <a:endParaRPr lang="en-TH"/>
+            <a:endParaRPr lang="en-TH" dirty="0"/>
           </a:p>
         </p:txBody>
       </p:sp>
@@ -2855,38 +2854,38 @@
           <a:p>
             <a:pPr lvl="0"/>
             <a:r>
-              <a:rPr lang="en-US"/>
+              <a:rPr lang="en-US" dirty="0"/>
               <a:t>Click to edit Master text styles</a:t>
             </a:r>
           </a:p>
           <a:p>
             <a:pPr lvl="1"/>
             <a:r>
-              <a:rPr lang="en-US"/>
+              <a:rPr lang="en-US" dirty="0"/>
               <a:t>Second level</a:t>
             </a:r>
           </a:p>
           <a:p>
             <a:pPr lvl="2"/>
             <a:r>
-              <a:rPr lang="en-US"/>
+              <a:rPr lang="en-US" dirty="0"/>
               <a:t>Third level</a:t>
             </a:r>
           </a:p>
           <a:p>
             <a:pPr lvl="3"/>
             <a:r>
-              <a:rPr lang="en-US"/>
+              <a:rPr lang="en-US" dirty="0"/>
               <a:t>Fourth level</a:t>
             </a:r>
           </a:p>
           <a:p>
             <a:pPr lvl="4"/>
             <a:r>
-              <a:rPr lang="en-US"/>
+              <a:rPr lang="en-US" dirty="0"/>
               <a:t>Fifth level</a:t>
             </a:r>
-            <a:endParaRPr lang="en-TH"/>
+            <a:endParaRPr lang="en-TH" dirty="0"/>
           </a:p>
         </p:txBody>
       </p:sp>
@@ -2931,7 +2930,7 @@
           <a:p>
             <a:fld id="{35E44566-E169-1B43-A35F-0A8894463DC4}" type="datetimeFigureOut">
               <a:rPr lang="en-TH" smtClean="0"/>
-              <a:t>9/6/2024 R</a:t>
+              <a:t>13/6/2024 R</a:t>
             </a:fld>
             <a:endParaRPr lang="en-TH"/>
           </a:p>
@@ -3353,144 +3352,55 @@
           <p:cNvPr id="2" name="Title 1">
             <a:extLst>
               <a:ext uri="{FF2B5EF4-FFF2-40B4-BE49-F238E27FC236}">
-                <a16:creationId xmlns:a16="http://schemas.microsoft.com/office/drawing/2014/main" id="{8F832F30-50B8-7B81-D9E2-2D4396BC7AF1}"/>
-              </a:ext>
-            </a:extLst>
-          </p:cNvPr>
-          <p:cNvSpPr>
-            <a:spLocks noGrp="1"/>
-          </p:cNvSpPr>
-          <p:nvPr>
-            <p:ph type="ctrTitle"/>
-          </p:nvPr>
-        </p:nvSpPr>
-        <p:spPr/>
-        <p:txBody>
-          <a:bodyPr/>
-          <a:lstStyle/>
-          <a:p>
-            <a:r>
-              <a:rPr lang="en-TH" dirty="0"/>
-              <a:t>Title</a:t>
-            </a:r>
-          </a:p>
-        </p:txBody>
-      </p:sp>
-      <p:sp>
-        <p:nvSpPr>
-          <p:cNvPr id="3" name="Subtitle 2">
-            <a:extLst>
-              <a:ext uri="{FF2B5EF4-FFF2-40B4-BE49-F238E27FC236}">
-                <a16:creationId xmlns:a16="http://schemas.microsoft.com/office/drawing/2014/main" id="{6A3FF99D-9C0C-4FB3-97CA-640E01673971}"/>
-              </a:ext>
-            </a:extLst>
-          </p:cNvPr>
-          <p:cNvSpPr>
-            <a:spLocks noGrp="1"/>
-          </p:cNvSpPr>
-          <p:nvPr>
-            <p:ph type="subTitle" idx="1"/>
-          </p:nvPr>
-        </p:nvSpPr>
-        <p:spPr/>
-        <p:txBody>
-          <a:bodyPr/>
-          <a:lstStyle/>
-          <a:p>
-            <a:r>
-              <a:rPr lang="en-TH" dirty="0"/>
-              <a:t>Name</a:t>
-            </a:r>
+                <a16:creationId xmlns:a16="http://schemas.microsoft.com/office/drawing/2014/main" id="{61B28FBF-5C0F-E98C-24F3-55F7162AC3A3}"/>
+              </a:ext>
+            </a:extLst>
+          </p:cNvPr>
+          <p:cNvSpPr>
+            <a:spLocks noGrp="1"/>
+          </p:cNvSpPr>
+          <p:nvPr>
+            <p:ph type="title"/>
+          </p:nvPr>
+        </p:nvSpPr>
+        <p:spPr/>
+        <p:txBody>
+          <a:bodyPr/>
+          <a:lstStyle/>
+          <a:p>
+            <a:endParaRPr lang="en-TH"/>
+          </a:p>
+        </p:txBody>
+      </p:sp>
+      <p:sp>
+        <p:nvSpPr>
+          <p:cNvPr id="3" name="R Placeholder">
+            <a:extLst>
+              <a:ext uri="{FF2B5EF4-FFF2-40B4-BE49-F238E27FC236}">
+                <a16:creationId xmlns:a16="http://schemas.microsoft.com/office/drawing/2014/main" id="{D7CE09C2-8FF9-2597-A53C-C11345D67C50}"/>
+              </a:ext>
+            </a:extLst>
+          </p:cNvPr>
+          <p:cNvSpPr>
+            <a:spLocks noGrp="1"/>
+          </p:cNvSpPr>
+          <p:nvPr>
+            <p:ph idx="1"/>
+          </p:nvPr>
+        </p:nvSpPr>
+        <p:spPr/>
+        <p:txBody>
+          <a:bodyPr/>
+          <a:lstStyle/>
+          <a:p>
+            <a:endParaRPr lang="en-TH"/>
           </a:p>
         </p:txBody>
       </p:sp>
     </p:spTree>
     <p:extLst>
       <p:ext uri="{BB962C8B-B14F-4D97-AF65-F5344CB8AC3E}">
-        <p14:creationId xmlns:p14="http://schemas.microsoft.com/office/powerpoint/2010/main" val="2517609425"/>
-      </p:ext>
-    </p:extLst>
-  </p:cSld>
-  <p:clrMapOvr>
-    <a:masterClrMapping/>
-  </p:clrMapOvr>
-</p:sld>
-</file>
-
-<file path=ppt/slides/slide2.xml><?xml version="1.0" encoding="utf-8"?>
-<p:sld xmlns:a="http://schemas.openxmlformats.org/drawingml/2006/main" xmlns:r="http://schemas.openxmlformats.org/officeDocument/2006/relationships" xmlns:p="http://schemas.openxmlformats.org/presentationml/2006/main">
-  <p:cSld>
-    <p:spTree>
-      <p:nvGrpSpPr>
-        <p:cNvPr id="1" name=""/>
-        <p:cNvGrpSpPr/>
-        <p:nvPr/>
-      </p:nvGrpSpPr>
-      <p:grpSpPr>
-        <a:xfrm>
-          <a:off x="0" y="0"/>
-          <a:ext cx="0" cy="0"/>
-          <a:chOff x="0" y="0"/>
-          <a:chExt cx="0" cy="0"/>
-        </a:xfrm>
-      </p:grpSpPr>
-      <p:sp>
-        <p:nvSpPr>
-          <p:cNvPr id="2" name="Title 1">
-            <a:extLst>
-              <a:ext uri="{FF2B5EF4-FFF2-40B4-BE49-F238E27FC236}">
-                <a16:creationId xmlns:a16="http://schemas.microsoft.com/office/drawing/2014/main" id="{BAF4098C-529F-A1A7-37FA-F457794A66A4}"/>
-              </a:ext>
-            </a:extLst>
-          </p:cNvPr>
-          <p:cNvSpPr>
-            <a:spLocks noGrp="1"/>
-          </p:cNvSpPr>
-          <p:nvPr>
-            <p:ph type="title"/>
-          </p:nvPr>
-        </p:nvSpPr>
-        <p:spPr/>
-        <p:txBody>
-          <a:bodyPr/>
-          <a:lstStyle/>
-          <a:p>
-            <a:r>
-              <a:rPr lang="en-TH" dirty="0"/>
-              <a:t>Balls and Point Graph</a:t>
-            </a:r>
-          </a:p>
-        </p:txBody>
-      </p:sp>
-      <p:sp>
-        <p:nvSpPr>
-          <p:cNvPr id="3" name="R Placeholder">
-            <a:extLst>
-              <a:ext uri="{FF2B5EF4-FFF2-40B4-BE49-F238E27FC236}">
-                <a16:creationId xmlns:a16="http://schemas.microsoft.com/office/drawing/2014/main" id="{A6A80BD4-1BD6-296D-ADF6-F3556B62EB25}"/>
-              </a:ext>
-            </a:extLst>
-          </p:cNvPr>
-          <p:cNvSpPr>
-            <a:spLocks noGrp="1"/>
-          </p:cNvSpPr>
-          <p:nvPr>
-            <p:ph idx="1"/>
-          </p:nvPr>
-        </p:nvSpPr>
-        <p:spPr/>
-        <p:txBody>
-          <a:bodyPr/>
-          <a:lstStyle/>
-          <a:p>
-            <a:endParaRPr lang="en-TH" dirty="0"/>
-          </a:p>
-        </p:txBody>
-      </p:sp>
-    </p:spTree>
-    <p:extLst>
-      <p:ext uri="{BB962C8B-B14F-4D97-AF65-F5344CB8AC3E}">
-        <p14:creationId xmlns:p14="http://schemas.microsoft.com/office/powerpoint/2010/main" val="845417077"/>
+        <p14:creationId xmlns:p14="http://schemas.microsoft.com/office/powerpoint/2010/main" val="1811444334"/>
       </p:ext>
     </p:extLst>
   </p:cSld>

</xml_diff>